<commit_message>
tiny wording changes for easier to understand ppt presentation
</commit_message>
<xml_diff>
--- a/Project7.pptx
+++ b/Project7.pptx
@@ -162,7 +162,7 @@
           </a:lstStyle>
           <a:p>
             <a:r>
-              <a:rPr lang="en-US" smtClean="0"/>
+              <a:rPr lang="en-US"/>
               <a:t>Click to edit Master title style</a:t>
             </a:r>
             <a:endParaRPr lang="en-US" dirty="0"/>
@@ -282,7 +282,7 @@
           </a:lstStyle>
           <a:p>
             <a:r>
-              <a:rPr lang="en-US" smtClean="0"/>
+              <a:rPr lang="en-US"/>
               <a:t>Click to edit Master subtitle style</a:t>
             </a:r>
             <a:endParaRPr lang="en-US" dirty="0"/>
@@ -306,7 +306,7 @@
           <a:p>
             <a:fld id="{5A8F6970-A742-4622-9A56-4655F99C264D}" type="datetimeFigureOut">
               <a:rPr lang="en-US" smtClean="0"/>
-              <a:t>12/3/2019</a:t>
+              <a:t>12/4/2019</a:t>
             </a:fld>
             <a:endParaRPr lang="en-US"/>
           </a:p>
@@ -411,7 +411,7 @@
           </a:lstStyle>
           <a:p>
             <a:r>
-              <a:rPr lang="en-US" smtClean="0"/>
+              <a:rPr lang="en-US"/>
               <a:t>Click to edit Master title style</a:t>
             </a:r>
             <a:endParaRPr lang="en-US" dirty="0"/>
@@ -490,7 +490,7 @@
           </a:lstStyle>
           <a:p>
             <a:r>
-              <a:rPr lang="en-US" smtClean="0"/>
+              <a:rPr lang="en-US"/>
               <a:t>Click icon to add picture</a:t>
             </a:r>
             <a:endParaRPr lang="en-US" dirty="0"/>
@@ -558,7 +558,7 @@
           <a:p>
             <a:pPr lvl="0"/>
             <a:r>
-              <a:rPr lang="en-US" smtClean="0"/>
+              <a:rPr lang="en-US"/>
               <a:t>Edit Master text styles</a:t>
             </a:r>
           </a:p>
@@ -581,7 +581,7 @@
           <a:p>
             <a:fld id="{5A8F6970-A742-4622-9A56-4655F99C264D}" type="datetimeFigureOut">
               <a:rPr lang="en-US" smtClean="0"/>
-              <a:t>12/3/2019</a:t>
+              <a:t>12/4/2019</a:t>
             </a:fld>
             <a:endParaRPr lang="en-US"/>
           </a:p>
@@ -684,7 +684,7 @@
           </a:lstStyle>
           <a:p>
             <a:r>
-              <a:rPr lang="en-US" smtClean="0"/>
+              <a:rPr lang="en-US"/>
               <a:t>Click to edit Master title style</a:t>
             </a:r>
             <a:endParaRPr lang="en-US" dirty="0"/>
@@ -752,7 +752,7 @@
           <a:p>
             <a:pPr lvl="0"/>
             <a:r>
-              <a:rPr lang="en-US" smtClean="0"/>
+              <a:rPr lang="en-US"/>
               <a:t>Edit Master text styles</a:t>
             </a:r>
           </a:p>
@@ -775,7 +775,7 @@
           <a:p>
             <a:fld id="{5A8F6970-A742-4622-9A56-4655F99C264D}" type="datetimeFigureOut">
               <a:rPr lang="en-US" smtClean="0"/>
-              <a:t>12/3/2019</a:t>
+              <a:t>12/4/2019</a:t>
             </a:fld>
             <a:endParaRPr lang="en-US"/>
           </a:p>
@@ -878,7 +878,7 @@
           </a:lstStyle>
           <a:p>
             <a:r>
-              <a:rPr lang="en-US" smtClean="0"/>
+              <a:rPr lang="en-US"/>
               <a:t>Click to edit Master title style</a:t>
             </a:r>
             <a:endParaRPr lang="en-US" dirty="0"/>
@@ -958,7 +958,7 @@
               <a:buNone/>
             </a:pPr>
             <a:r>
-              <a:rPr lang="en-US" smtClean="0"/>
+              <a:rPr lang="en-US"/>
               <a:t>Edit Master text styles</a:t>
             </a:r>
           </a:p>
@@ -1025,7 +1025,7 @@
           <a:p>
             <a:pPr lvl="0"/>
             <a:r>
-              <a:rPr lang="en-US" smtClean="0"/>
+              <a:rPr lang="en-US"/>
               <a:t>Edit Master text styles</a:t>
             </a:r>
           </a:p>
@@ -1048,7 +1048,7 @@
           <a:p>
             <a:fld id="{5A8F6970-A742-4622-9A56-4655F99C264D}" type="datetimeFigureOut">
               <a:rPr lang="en-US" smtClean="0"/>
-              <a:t>12/3/2019</a:t>
+              <a:t>12/4/2019</a:t>
             </a:fld>
             <a:endParaRPr lang="en-US"/>
           </a:p>
@@ -1245,7 +1245,7 @@
           </a:lstStyle>
           <a:p>
             <a:r>
-              <a:rPr lang="en-US" smtClean="0"/>
+              <a:rPr lang="en-US"/>
               <a:t>Click to edit Master title style</a:t>
             </a:r>
             <a:endParaRPr lang="en-US" dirty="0"/>
@@ -1366,7 +1366,7 @@
           <a:p>
             <a:pPr lvl="0"/>
             <a:r>
-              <a:rPr lang="en-US" smtClean="0"/>
+              <a:rPr lang="en-US"/>
               <a:t>Edit Master text styles</a:t>
             </a:r>
           </a:p>
@@ -1389,7 +1389,7 @@
           <a:p>
             <a:fld id="{5A8F6970-A742-4622-9A56-4655F99C264D}" type="datetimeFigureOut">
               <a:rPr lang="en-US" smtClean="0"/>
-              <a:t>12/3/2019</a:t>
+              <a:t>12/4/2019</a:t>
             </a:fld>
             <a:endParaRPr lang="en-US"/>
           </a:p>
@@ -1487,7 +1487,7 @@
           </a:lstStyle>
           <a:p>
             <a:r>
-              <a:rPr lang="en-US" smtClean="0"/>
+              <a:rPr lang="en-US"/>
               <a:t>Click to edit Master title style</a:t>
             </a:r>
             <a:endParaRPr lang="en-US" dirty="0"/>
@@ -1562,7 +1562,7 @@
           <a:p>
             <a:pPr lvl="0"/>
             <a:r>
-              <a:rPr lang="en-US" smtClean="0"/>
+              <a:rPr lang="en-US"/>
               <a:t>Edit Master text styles</a:t>
             </a:r>
           </a:p>
@@ -1629,7 +1629,7 @@
           <a:p>
             <a:pPr lvl="0"/>
             <a:r>
-              <a:rPr lang="en-US" smtClean="0"/>
+              <a:rPr lang="en-US"/>
               <a:t>Edit Master text styles</a:t>
             </a:r>
           </a:p>
@@ -1703,7 +1703,7 @@
           <a:p>
             <a:pPr lvl="0"/>
             <a:r>
-              <a:rPr lang="en-US" smtClean="0"/>
+              <a:rPr lang="en-US"/>
               <a:t>Edit Master text styles</a:t>
             </a:r>
           </a:p>
@@ -1770,7 +1770,7 @@
           <a:p>
             <a:pPr lvl="0"/>
             <a:r>
-              <a:rPr lang="en-US" smtClean="0"/>
+              <a:rPr lang="en-US"/>
               <a:t>Edit Master text styles</a:t>
             </a:r>
           </a:p>
@@ -1844,7 +1844,7 @@
           <a:p>
             <a:pPr lvl="0"/>
             <a:r>
-              <a:rPr lang="en-US" smtClean="0"/>
+              <a:rPr lang="en-US"/>
               <a:t>Edit Master text styles</a:t>
             </a:r>
           </a:p>
@@ -1911,7 +1911,7 @@
           <a:p>
             <a:pPr lvl="0"/>
             <a:r>
-              <a:rPr lang="en-US" smtClean="0"/>
+              <a:rPr lang="en-US"/>
               <a:t>Edit Master text styles</a:t>
             </a:r>
           </a:p>
@@ -2012,7 +2012,7 @@
           <a:p>
             <a:fld id="{5A8F6970-A742-4622-9A56-4655F99C264D}" type="datetimeFigureOut">
               <a:rPr lang="en-US" smtClean="0"/>
-              <a:t>12/3/2019</a:t>
+              <a:t>12/4/2019</a:t>
             </a:fld>
             <a:endParaRPr lang="en-US"/>
           </a:p>
@@ -2110,7 +2110,7 @@
           </a:lstStyle>
           <a:p>
             <a:r>
-              <a:rPr lang="en-US" smtClean="0"/>
+              <a:rPr lang="en-US"/>
               <a:t>Click to edit Master title style</a:t>
             </a:r>
             <a:endParaRPr lang="en-US" dirty="0"/>
@@ -2185,7 +2185,7 @@
           <a:p>
             <a:pPr lvl="0"/>
             <a:r>
-              <a:rPr lang="en-US" smtClean="0"/>
+              <a:rPr lang="en-US"/>
               <a:t>Edit Master text styles</a:t>
             </a:r>
           </a:p>
@@ -2263,7 +2263,7 @@
           </a:lstStyle>
           <a:p>
             <a:r>
-              <a:rPr lang="en-US" smtClean="0"/>
+              <a:rPr lang="en-US"/>
               <a:t>Click icon to add picture</a:t>
             </a:r>
             <a:endParaRPr lang="en-US" dirty="0"/>
@@ -2331,7 +2331,7 @@
           <a:p>
             <a:pPr lvl="0"/>
             <a:r>
-              <a:rPr lang="en-US" smtClean="0"/>
+              <a:rPr lang="en-US"/>
               <a:t>Edit Master text styles</a:t>
             </a:r>
           </a:p>
@@ -2405,7 +2405,7 @@
           <a:p>
             <a:pPr lvl="0"/>
             <a:r>
-              <a:rPr lang="en-US" smtClean="0"/>
+              <a:rPr lang="en-US"/>
               <a:t>Edit Master text styles</a:t>
             </a:r>
           </a:p>
@@ -2483,7 +2483,7 @@
           </a:lstStyle>
           <a:p>
             <a:r>
-              <a:rPr lang="en-US" smtClean="0"/>
+              <a:rPr lang="en-US"/>
               <a:t>Click icon to add picture</a:t>
             </a:r>
             <a:endParaRPr lang="en-US" dirty="0"/>
@@ -2551,7 +2551,7 @@
           <a:p>
             <a:pPr lvl="0"/>
             <a:r>
-              <a:rPr lang="en-US" smtClean="0"/>
+              <a:rPr lang="en-US"/>
               <a:t>Edit Master text styles</a:t>
             </a:r>
           </a:p>
@@ -2625,7 +2625,7 @@
           <a:p>
             <a:pPr lvl="0"/>
             <a:r>
-              <a:rPr lang="en-US" smtClean="0"/>
+              <a:rPr lang="en-US"/>
               <a:t>Edit Master text styles</a:t>
             </a:r>
           </a:p>
@@ -2703,7 +2703,7 @@
           </a:lstStyle>
           <a:p>
             <a:r>
-              <a:rPr lang="en-US" smtClean="0"/>
+              <a:rPr lang="en-US"/>
               <a:t>Click icon to add picture</a:t>
             </a:r>
             <a:endParaRPr lang="en-US" dirty="0"/>
@@ -2771,7 +2771,7 @@
           <a:p>
             <a:pPr lvl="0"/>
             <a:r>
-              <a:rPr lang="en-US" smtClean="0"/>
+              <a:rPr lang="en-US"/>
               <a:t>Edit Master text styles</a:t>
             </a:r>
           </a:p>
@@ -2872,7 +2872,7 @@
           <a:p>
             <a:fld id="{5A8F6970-A742-4622-9A56-4655F99C264D}" type="datetimeFigureOut">
               <a:rPr lang="en-US" smtClean="0"/>
-              <a:t>12/3/2019</a:t>
+              <a:t>12/4/2019</a:t>
             </a:fld>
             <a:endParaRPr lang="en-US"/>
           </a:p>
@@ -2966,7 +2966,7 @@
           <a:lstStyle/>
           <a:p>
             <a:r>
-              <a:rPr lang="en-US" smtClean="0"/>
+              <a:rPr lang="en-US"/>
               <a:t>Click to edit Master title style</a:t>
             </a:r>
             <a:endParaRPr lang="en-US" dirty="0"/>
@@ -2990,35 +2990,35 @@
           <a:p>
             <a:pPr lvl="0"/>
             <a:r>
-              <a:rPr lang="en-US" smtClean="0"/>
+              <a:rPr lang="en-US"/>
               <a:t>Edit Master text styles</a:t>
             </a:r>
           </a:p>
           <a:p>
             <a:pPr lvl="1"/>
             <a:r>
-              <a:rPr lang="en-US" smtClean="0"/>
+              <a:rPr lang="en-US"/>
               <a:t>Second level</a:t>
             </a:r>
           </a:p>
           <a:p>
             <a:pPr lvl="2"/>
             <a:r>
-              <a:rPr lang="en-US" smtClean="0"/>
+              <a:rPr lang="en-US"/>
               <a:t>Third level</a:t>
             </a:r>
           </a:p>
           <a:p>
             <a:pPr lvl="3"/>
             <a:r>
-              <a:rPr lang="en-US" smtClean="0"/>
+              <a:rPr lang="en-US"/>
               <a:t>Fourth level</a:t>
             </a:r>
           </a:p>
           <a:p>
             <a:pPr lvl="4"/>
             <a:r>
-              <a:rPr lang="en-US" smtClean="0"/>
+              <a:rPr lang="en-US"/>
               <a:t>Fifth level</a:t>
             </a:r>
             <a:endParaRPr lang="en-US" dirty="0"/>
@@ -3042,7 +3042,7 @@
           <a:p>
             <a:fld id="{5A8F6970-A742-4622-9A56-4655F99C264D}" type="datetimeFigureOut">
               <a:rPr lang="en-US" smtClean="0"/>
-              <a:t>12/3/2019</a:t>
+              <a:t>12/4/2019</a:t>
             </a:fld>
             <a:endParaRPr lang="en-US"/>
           </a:p>
@@ -3141,7 +3141,7 @@
           <a:lstStyle/>
           <a:p>
             <a:r>
-              <a:rPr lang="en-US" smtClean="0"/>
+              <a:rPr lang="en-US"/>
               <a:t>Click to edit Master title style</a:t>
             </a:r>
             <a:endParaRPr lang="en-US" dirty="0"/>
@@ -3170,35 +3170,35 @@
           <a:p>
             <a:pPr lvl="0"/>
             <a:r>
-              <a:rPr lang="en-US" smtClean="0"/>
+              <a:rPr lang="en-US"/>
               <a:t>Edit Master text styles</a:t>
             </a:r>
           </a:p>
           <a:p>
             <a:pPr lvl="1"/>
             <a:r>
-              <a:rPr lang="en-US" smtClean="0"/>
+              <a:rPr lang="en-US"/>
               <a:t>Second level</a:t>
             </a:r>
           </a:p>
           <a:p>
             <a:pPr lvl="2"/>
             <a:r>
-              <a:rPr lang="en-US" smtClean="0"/>
+              <a:rPr lang="en-US"/>
               <a:t>Third level</a:t>
             </a:r>
           </a:p>
           <a:p>
             <a:pPr lvl="3"/>
             <a:r>
-              <a:rPr lang="en-US" smtClean="0"/>
+              <a:rPr lang="en-US"/>
               <a:t>Fourth level</a:t>
             </a:r>
           </a:p>
           <a:p>
             <a:pPr lvl="4"/>
             <a:r>
-              <a:rPr lang="en-US" smtClean="0"/>
+              <a:rPr lang="en-US"/>
               <a:t>Fifth level</a:t>
             </a:r>
             <a:endParaRPr lang="en-US" dirty="0"/>
@@ -3222,7 +3222,7 @@
           <a:p>
             <a:fld id="{5A8F6970-A742-4622-9A56-4655F99C264D}" type="datetimeFigureOut">
               <a:rPr lang="en-US" smtClean="0"/>
-              <a:t>12/3/2019</a:t>
+              <a:t>12/4/2019</a:t>
             </a:fld>
             <a:endParaRPr lang="en-US"/>
           </a:p>
@@ -3316,7 +3316,7 @@
           <a:lstStyle/>
           <a:p>
             <a:r>
-              <a:rPr lang="en-US" smtClean="0"/>
+              <a:rPr lang="en-US"/>
               <a:t>Click to edit Master title style</a:t>
             </a:r>
             <a:endParaRPr lang="en-US" dirty="0"/>
@@ -3340,35 +3340,35 @@
           <a:p>
             <a:pPr lvl="0"/>
             <a:r>
-              <a:rPr lang="en-US" smtClean="0"/>
+              <a:rPr lang="en-US"/>
               <a:t>Edit Master text styles</a:t>
             </a:r>
           </a:p>
           <a:p>
             <a:pPr lvl="1"/>
             <a:r>
-              <a:rPr lang="en-US" smtClean="0"/>
+              <a:rPr lang="en-US"/>
               <a:t>Second level</a:t>
             </a:r>
           </a:p>
           <a:p>
             <a:pPr lvl="2"/>
             <a:r>
-              <a:rPr lang="en-US" smtClean="0"/>
+              <a:rPr lang="en-US"/>
               <a:t>Third level</a:t>
             </a:r>
           </a:p>
           <a:p>
             <a:pPr lvl="3"/>
             <a:r>
-              <a:rPr lang="en-US" smtClean="0"/>
+              <a:rPr lang="en-US"/>
               <a:t>Fourth level</a:t>
             </a:r>
           </a:p>
           <a:p>
             <a:pPr lvl="4"/>
             <a:r>
-              <a:rPr lang="en-US" smtClean="0"/>
+              <a:rPr lang="en-US"/>
               <a:t>Fifth level</a:t>
             </a:r>
             <a:endParaRPr lang="en-US" dirty="0"/>
@@ -3392,7 +3392,7 @@
           <a:p>
             <a:fld id="{5A8F6970-A742-4622-9A56-4655F99C264D}" type="datetimeFigureOut">
               <a:rPr lang="en-US" smtClean="0"/>
-              <a:t>12/3/2019</a:t>
+              <a:t>12/4/2019</a:t>
             </a:fld>
             <a:endParaRPr lang="en-US"/>
           </a:p>
@@ -3495,7 +3495,7 @@
           </a:lstStyle>
           <a:p>
             <a:r>
-              <a:rPr lang="en-US" smtClean="0"/>
+              <a:rPr lang="en-US"/>
               <a:t>Click to edit Master title style</a:t>
             </a:r>
             <a:endParaRPr lang="en-US" dirty="0"/>
@@ -3616,7 +3616,7 @@
           <a:p>
             <a:pPr lvl="0"/>
             <a:r>
-              <a:rPr lang="en-US" smtClean="0"/>
+              <a:rPr lang="en-US"/>
               <a:t>Edit Master text styles</a:t>
             </a:r>
           </a:p>
@@ -3639,7 +3639,7 @@
           <a:p>
             <a:fld id="{5A8F6970-A742-4622-9A56-4655F99C264D}" type="datetimeFigureOut">
               <a:rPr lang="en-US" smtClean="0"/>
-              <a:t>12/3/2019</a:t>
+              <a:t>12/4/2019</a:t>
             </a:fld>
             <a:endParaRPr lang="en-US"/>
           </a:p>
@@ -3733,7 +3733,7 @@
           <a:lstStyle/>
           <a:p>
             <a:r>
-              <a:rPr lang="en-US" smtClean="0"/>
+              <a:rPr lang="en-US"/>
               <a:t>Click to edit Master title style</a:t>
             </a:r>
             <a:endParaRPr lang="en-US" dirty="0"/>
@@ -3792,35 +3792,35 @@
           <a:p>
             <a:pPr lvl="0"/>
             <a:r>
-              <a:rPr lang="en-US" smtClean="0"/>
+              <a:rPr lang="en-US"/>
               <a:t>Edit Master text styles</a:t>
             </a:r>
           </a:p>
           <a:p>
             <a:pPr lvl="1"/>
             <a:r>
-              <a:rPr lang="en-US" smtClean="0"/>
+              <a:rPr lang="en-US"/>
               <a:t>Second level</a:t>
             </a:r>
           </a:p>
           <a:p>
             <a:pPr lvl="2"/>
             <a:r>
-              <a:rPr lang="en-US" smtClean="0"/>
+              <a:rPr lang="en-US"/>
               <a:t>Third level</a:t>
             </a:r>
           </a:p>
           <a:p>
             <a:pPr lvl="3"/>
             <a:r>
-              <a:rPr lang="en-US" smtClean="0"/>
+              <a:rPr lang="en-US"/>
               <a:t>Fourth level</a:t>
             </a:r>
           </a:p>
           <a:p>
             <a:pPr lvl="4"/>
             <a:r>
-              <a:rPr lang="en-US" smtClean="0"/>
+              <a:rPr lang="en-US"/>
               <a:t>Fifth level</a:t>
             </a:r>
             <a:endParaRPr lang="en-US" dirty="0"/>
@@ -3879,35 +3879,35 @@
           <a:p>
             <a:pPr lvl="0"/>
             <a:r>
-              <a:rPr lang="en-US" smtClean="0"/>
+              <a:rPr lang="en-US"/>
               <a:t>Edit Master text styles</a:t>
             </a:r>
           </a:p>
           <a:p>
             <a:pPr lvl="1"/>
             <a:r>
-              <a:rPr lang="en-US" smtClean="0"/>
+              <a:rPr lang="en-US"/>
               <a:t>Second level</a:t>
             </a:r>
           </a:p>
           <a:p>
             <a:pPr lvl="2"/>
             <a:r>
-              <a:rPr lang="en-US" smtClean="0"/>
+              <a:rPr lang="en-US"/>
               <a:t>Third level</a:t>
             </a:r>
           </a:p>
           <a:p>
             <a:pPr lvl="3"/>
             <a:r>
-              <a:rPr lang="en-US" smtClean="0"/>
+              <a:rPr lang="en-US"/>
               <a:t>Fourth level</a:t>
             </a:r>
           </a:p>
           <a:p>
             <a:pPr lvl="4"/>
             <a:r>
-              <a:rPr lang="en-US" smtClean="0"/>
+              <a:rPr lang="en-US"/>
               <a:t>Fifth level</a:t>
             </a:r>
             <a:endParaRPr lang="en-US" dirty="0"/>
@@ -3931,7 +3931,7 @@
           <a:p>
             <a:fld id="{5A8F6970-A742-4622-9A56-4655F99C264D}" type="datetimeFigureOut">
               <a:rPr lang="en-US" smtClean="0"/>
-              <a:t>12/3/2019</a:t>
+              <a:t>12/4/2019</a:t>
             </a:fld>
             <a:endParaRPr lang="en-US"/>
           </a:p>
@@ -4029,7 +4029,7 @@
           </a:lstStyle>
           <a:p>
             <a:r>
-              <a:rPr lang="en-US" smtClean="0"/>
+              <a:rPr lang="en-US"/>
               <a:t>Click to edit Master title style</a:t>
             </a:r>
             <a:endParaRPr lang="en-US" dirty="0"/>
@@ -4104,7 +4104,7 @@
           <a:p>
             <a:pPr lvl="0"/>
             <a:r>
-              <a:rPr lang="en-US" smtClean="0"/>
+              <a:rPr lang="en-US"/>
               <a:t>Edit Master text styles</a:t>
             </a:r>
           </a:p>
@@ -4162,35 +4162,35 @@
           <a:p>
             <a:pPr lvl="0"/>
             <a:r>
-              <a:rPr lang="en-US" smtClean="0"/>
+              <a:rPr lang="en-US"/>
               <a:t>Edit Master text styles</a:t>
             </a:r>
           </a:p>
           <a:p>
             <a:pPr lvl="1"/>
             <a:r>
-              <a:rPr lang="en-US" smtClean="0"/>
+              <a:rPr lang="en-US"/>
               <a:t>Second level</a:t>
             </a:r>
           </a:p>
           <a:p>
             <a:pPr lvl="2"/>
             <a:r>
-              <a:rPr lang="en-US" smtClean="0"/>
+              <a:rPr lang="en-US"/>
               <a:t>Third level</a:t>
             </a:r>
           </a:p>
           <a:p>
             <a:pPr lvl="3"/>
             <a:r>
-              <a:rPr lang="en-US" smtClean="0"/>
+              <a:rPr lang="en-US"/>
               <a:t>Fourth level</a:t>
             </a:r>
           </a:p>
           <a:p>
             <a:pPr lvl="4"/>
             <a:r>
-              <a:rPr lang="en-US" smtClean="0"/>
+              <a:rPr lang="en-US"/>
               <a:t>Fifth level</a:t>
             </a:r>
             <a:endParaRPr lang="en-US" dirty="0"/>
@@ -4265,7 +4265,7 @@
           <a:p>
             <a:pPr lvl="0"/>
             <a:r>
-              <a:rPr lang="en-US" smtClean="0"/>
+              <a:rPr lang="en-US"/>
               <a:t>Edit Master text styles</a:t>
             </a:r>
           </a:p>
@@ -4323,35 +4323,35 @@
           <a:p>
             <a:pPr lvl="0"/>
             <a:r>
-              <a:rPr lang="en-US" smtClean="0"/>
+              <a:rPr lang="en-US"/>
               <a:t>Edit Master text styles</a:t>
             </a:r>
           </a:p>
           <a:p>
             <a:pPr lvl="1"/>
             <a:r>
-              <a:rPr lang="en-US" smtClean="0"/>
+              <a:rPr lang="en-US"/>
               <a:t>Second level</a:t>
             </a:r>
           </a:p>
           <a:p>
             <a:pPr lvl="2"/>
             <a:r>
-              <a:rPr lang="en-US" smtClean="0"/>
+              <a:rPr lang="en-US"/>
               <a:t>Third level</a:t>
             </a:r>
           </a:p>
           <a:p>
             <a:pPr lvl="3"/>
             <a:r>
-              <a:rPr lang="en-US" smtClean="0"/>
+              <a:rPr lang="en-US"/>
               <a:t>Fourth level</a:t>
             </a:r>
           </a:p>
           <a:p>
             <a:pPr lvl="4"/>
             <a:r>
-              <a:rPr lang="en-US" smtClean="0"/>
+              <a:rPr lang="en-US"/>
               <a:t>Fifth level</a:t>
             </a:r>
             <a:endParaRPr lang="en-US" dirty="0"/>
@@ -4375,7 +4375,7 @@
           <a:p>
             <a:fld id="{5A8F6970-A742-4622-9A56-4655F99C264D}" type="datetimeFigureOut">
               <a:rPr lang="en-US" smtClean="0"/>
-              <a:t>12/3/2019</a:t>
+              <a:t>12/4/2019</a:t>
             </a:fld>
             <a:endParaRPr lang="en-US"/>
           </a:p>
@@ -4469,7 +4469,7 @@
           <a:lstStyle/>
           <a:p>
             <a:r>
-              <a:rPr lang="en-US" smtClean="0"/>
+              <a:rPr lang="en-US"/>
               <a:t>Click to edit Master title style</a:t>
             </a:r>
             <a:endParaRPr lang="en-US" dirty="0"/>
@@ -4493,7 +4493,7 @@
           <a:p>
             <a:fld id="{5A8F6970-A742-4622-9A56-4655F99C264D}" type="datetimeFigureOut">
               <a:rPr lang="en-US" smtClean="0"/>
-              <a:t>12/3/2019</a:t>
+              <a:t>12/4/2019</a:t>
             </a:fld>
             <a:endParaRPr lang="en-US"/>
           </a:p>
@@ -4588,7 +4588,7 @@
           <a:p>
             <a:fld id="{5A8F6970-A742-4622-9A56-4655F99C264D}" type="datetimeFigureOut">
               <a:rPr lang="en-US" smtClean="0"/>
-              <a:t>12/3/2019</a:t>
+              <a:t>12/4/2019</a:t>
             </a:fld>
             <a:endParaRPr lang="en-US"/>
           </a:p>
@@ -4691,7 +4691,7 @@
           </a:lstStyle>
           <a:p>
             <a:r>
-              <a:rPr lang="en-US" smtClean="0"/>
+              <a:rPr lang="en-US"/>
               <a:t>Click to edit Master title style</a:t>
             </a:r>
             <a:endParaRPr lang="en-US" dirty="0"/>
@@ -4750,35 +4750,35 @@
           <a:p>
             <a:pPr lvl="0"/>
             <a:r>
-              <a:rPr lang="en-US" smtClean="0"/>
+              <a:rPr lang="en-US"/>
               <a:t>Edit Master text styles</a:t>
             </a:r>
           </a:p>
           <a:p>
             <a:pPr lvl="1"/>
             <a:r>
-              <a:rPr lang="en-US" smtClean="0"/>
+              <a:rPr lang="en-US"/>
               <a:t>Second level</a:t>
             </a:r>
           </a:p>
           <a:p>
             <a:pPr lvl="2"/>
             <a:r>
-              <a:rPr lang="en-US" smtClean="0"/>
+              <a:rPr lang="en-US"/>
               <a:t>Third level</a:t>
             </a:r>
           </a:p>
           <a:p>
             <a:pPr lvl="3"/>
             <a:r>
-              <a:rPr lang="en-US" smtClean="0"/>
+              <a:rPr lang="en-US"/>
               <a:t>Fourth level</a:t>
             </a:r>
           </a:p>
           <a:p>
             <a:pPr lvl="4"/>
             <a:r>
-              <a:rPr lang="en-US" smtClean="0"/>
+              <a:rPr lang="en-US"/>
               <a:t>Fifth level</a:t>
             </a:r>
             <a:endParaRPr lang="en-US" dirty="0"/>
@@ -4844,7 +4844,7 @@
           <a:p>
             <a:pPr lvl="0"/>
             <a:r>
-              <a:rPr lang="en-US" smtClean="0"/>
+              <a:rPr lang="en-US"/>
               <a:t>Edit Master text styles</a:t>
             </a:r>
           </a:p>
@@ -4867,7 +4867,7 @@
           <a:p>
             <a:fld id="{5A8F6970-A742-4622-9A56-4655F99C264D}" type="datetimeFigureOut">
               <a:rPr lang="en-US" smtClean="0"/>
-              <a:t>12/3/2019</a:t>
+              <a:t>12/4/2019</a:t>
             </a:fld>
             <a:endParaRPr lang="en-US"/>
           </a:p>
@@ -4972,7 +4972,7 @@
           </a:lstStyle>
           <a:p>
             <a:r>
-              <a:rPr lang="en-US" smtClean="0"/>
+              <a:rPr lang="en-US"/>
               <a:t>Click to edit Master title style</a:t>
             </a:r>
             <a:endParaRPr lang="en-US" dirty="0"/>
@@ -5051,7 +5051,7 @@
           </a:lstStyle>
           <a:p>
             <a:r>
-              <a:rPr lang="en-US" smtClean="0"/>
+              <a:rPr lang="en-US"/>
               <a:t>Click icon to add picture</a:t>
             </a:r>
             <a:endParaRPr lang="en-US" dirty="0"/>
@@ -5119,7 +5119,7 @@
           <a:p>
             <a:pPr lvl="0"/>
             <a:r>
-              <a:rPr lang="en-US" smtClean="0"/>
+              <a:rPr lang="en-US"/>
               <a:t>Edit Master text styles</a:t>
             </a:r>
           </a:p>
@@ -5142,7 +5142,7 @@
           <a:p>
             <a:fld id="{5A8F6970-A742-4622-9A56-4655F99C264D}" type="datetimeFigureOut">
               <a:rPr lang="en-US" smtClean="0"/>
-              <a:t>12/3/2019</a:t>
+              <a:t>12/4/2019</a:t>
             </a:fld>
             <a:endParaRPr lang="en-US"/>
           </a:p>
@@ -5466,7 +5466,7 @@
           <a:lstStyle/>
           <a:p>
             <a:r>
-              <a:rPr lang="en-US" smtClean="0"/>
+              <a:rPr lang="en-US"/>
               <a:t>Click to edit Master title style</a:t>
             </a:r>
             <a:endParaRPr lang="en-US" dirty="0"/>
@@ -5500,35 +5500,35 @@
           <a:p>
             <a:pPr lvl="0"/>
             <a:r>
-              <a:rPr lang="en-US" smtClean="0"/>
+              <a:rPr lang="en-US"/>
               <a:t>Edit Master text styles</a:t>
             </a:r>
           </a:p>
           <a:p>
             <a:pPr lvl="1"/>
             <a:r>
-              <a:rPr lang="en-US" smtClean="0"/>
+              <a:rPr lang="en-US"/>
               <a:t>Second level</a:t>
             </a:r>
           </a:p>
           <a:p>
             <a:pPr lvl="2"/>
             <a:r>
-              <a:rPr lang="en-US" smtClean="0"/>
+              <a:rPr lang="en-US"/>
               <a:t>Third level</a:t>
             </a:r>
           </a:p>
           <a:p>
             <a:pPr lvl="3"/>
             <a:r>
-              <a:rPr lang="en-US" smtClean="0"/>
+              <a:rPr lang="en-US"/>
               <a:t>Fourth level</a:t>
             </a:r>
           </a:p>
           <a:p>
             <a:pPr lvl="4"/>
             <a:r>
-              <a:rPr lang="en-US" smtClean="0"/>
+              <a:rPr lang="en-US"/>
               <a:t>Fifth level</a:t>
             </a:r>
             <a:endParaRPr lang="en-US" dirty="0"/>
@@ -5571,7 +5571,7 @@
           <a:p>
             <a:fld id="{5A8F6970-A742-4622-9A56-4655F99C264D}" type="datetimeFigureOut">
               <a:rPr lang="en-US" smtClean="0"/>
-              <a:t>12/3/2019</a:t>
+              <a:t>12/4/2019</a:t>
             </a:fld>
             <a:endParaRPr lang="en-US"/>
           </a:p>
@@ -6151,37 +6151,36 @@
           <a:lstStyle/>
           <a:p>
             <a:r>
-              <a:rPr lang="en-US" sz="1200" dirty="0" smtClean="0"/>
+              <a:rPr lang="en-US" sz="1200" dirty="0"/>
               <a:t>Sam Hardin</a:t>
             </a:r>
           </a:p>
           <a:p>
             <a:r>
-              <a:rPr lang="en-US" sz="1200" dirty="0" smtClean="0"/>
+              <a:rPr lang="en-US" sz="1200" dirty="0"/>
               <a:t>Sawyer </a:t>
             </a:r>
             <a:r>
-              <a:rPr lang="en-US" sz="1200" dirty="0" err="1" smtClean="0"/>
+              <a:rPr lang="en-US" sz="1200" dirty="0" err="1"/>
               <a:t>Goodsel</a:t>
             </a:r>
-            <a:endParaRPr lang="en-US" sz="1200" dirty="0" smtClean="0"/>
-          </a:p>
-          <a:p>
-            <a:r>
-              <a:rPr lang="en-US" sz="1200" dirty="0" smtClean="0"/>
+            <a:endParaRPr lang="en-US" sz="1200" dirty="0"/>
+          </a:p>
+          <a:p>
+            <a:r>
+              <a:rPr lang="en-US" sz="1200" dirty="0"/>
               <a:t>Matthew Gilbert</a:t>
             </a:r>
           </a:p>
           <a:p>
             <a:r>
-              <a:rPr lang="en-US" sz="1200" dirty="0" err="1" smtClean="0"/>
+              <a:rPr lang="en-US" sz="1200" dirty="0" err="1"/>
               <a:t>Chunyan</a:t>
             </a:r>
             <a:r>
-              <a:rPr lang="en-US" sz="1200" dirty="0" smtClean="0"/>
+              <a:rPr lang="en-US" sz="1200" dirty="0"/>
               <a:t> Li</a:t>
             </a:r>
-            <a:endParaRPr lang="en-US" sz="1200" dirty="0"/>
           </a:p>
         </p:txBody>
       </p:sp>
@@ -6237,10 +6236,9 @@
           <a:lstStyle/>
           <a:p>
             <a:r>
-              <a:rPr lang="en-US" dirty="0" smtClean="0"/>
+              <a:rPr lang="en-US" dirty="0"/>
               <a:t>Overview</a:t>
             </a:r>
-            <a:endParaRPr lang="en-US" dirty="0"/>
           </a:p>
         </p:txBody>
       </p:sp>
@@ -6378,22 +6376,21 @@
           <a:lstStyle/>
           <a:p>
             <a:r>
-              <a:rPr lang="en-US" dirty="0" smtClean="0"/>
-              <a:t>Many good commercial runtime profilers</a:t>
-            </a:r>
-          </a:p>
-          <a:p>
-            <a:r>
-              <a:rPr lang="en-US" dirty="0" smtClean="0"/>
+              <a:rPr lang="en-US" dirty="0"/>
+              <a:t>Many good commercial runtime profilers already exist</a:t>
+            </a:r>
+          </a:p>
+          <a:p>
+            <a:r>
+              <a:rPr lang="en-US" dirty="0"/>
               <a:t>Visualizing code thumbprints can give quick overall impression</a:t>
             </a:r>
           </a:p>
           <a:p>
             <a:r>
-              <a:rPr lang="en-US" dirty="0" smtClean="0"/>
-              <a:t>Help identify areas to work on</a:t>
-            </a:r>
-            <a:endParaRPr lang="en-US" dirty="0"/>
+              <a:rPr lang="en-US" dirty="0"/>
+              <a:t>Help identify areas that could use work</a:t>
+            </a:r>
           </a:p>
         </p:txBody>
       </p:sp>
@@ -6449,10 +6446,9 @@
           <a:lstStyle/>
           <a:p>
             <a:r>
-              <a:rPr lang="en-US" dirty="0" smtClean="0"/>
+              <a:rPr lang="en-US" dirty="0"/>
               <a:t>Demo</a:t>
             </a:r>
-            <a:endParaRPr lang="en-US" dirty="0"/>
           </a:p>
         </p:txBody>
       </p:sp>
@@ -6654,19 +6650,19 @@
           <a:lstStyle/>
           <a:p>
             <a:r>
-              <a:rPr lang="en-US" dirty="0" smtClean="0"/>
+              <a:rPr lang="en-US" dirty="0"/>
               <a:t>Keywords</a:t>
             </a:r>
           </a:p>
           <a:p>
             <a:r>
-              <a:rPr lang="en-US" dirty="0" smtClean="0"/>
+              <a:rPr lang="en-US" dirty="0"/>
               <a:t>Code versus comments</a:t>
             </a:r>
           </a:p>
           <a:p>
             <a:r>
-              <a:rPr lang="en-US" dirty="0" smtClean="0"/>
+              <a:rPr lang="en-US" dirty="0"/>
               <a:t>File size</a:t>
             </a:r>
           </a:p>
@@ -6752,19 +6748,18 @@
           <a:lstStyle/>
           <a:p>
             <a:r>
-              <a:rPr lang="en-US" dirty="0" smtClean="0"/>
+              <a:rPr lang="en-US" dirty="0"/>
               <a:t>Identify outliers</a:t>
             </a:r>
           </a:p>
           <a:p>
             <a:r>
-              <a:rPr lang="en-US" dirty="0" smtClean="0"/>
+              <a:rPr lang="en-US" dirty="0"/>
               <a:t>Provide a unique visual representation of codebase</a:t>
             </a:r>
+          </a:p>
+          <a:p>
             <a:endParaRPr lang="en-US" dirty="0"/>
-          </a:p>
-          <a:p>
-            <a:endParaRPr lang="en-US" dirty="0" smtClean="0"/>
           </a:p>
         </p:txBody>
       </p:sp>
@@ -6814,10 +6809,9 @@
           <a:lstStyle/>
           <a:p>
             <a:r>
-              <a:rPr lang="en-US" dirty="0" smtClean="0"/>
+              <a:rPr lang="en-US" dirty="0"/>
               <a:t>Future Work</a:t>
             </a:r>
-            <a:endParaRPr lang="en-US" dirty="0"/>
           </a:p>
         </p:txBody>
       </p:sp>
@@ -6837,17 +6831,19 @@
           <a:lstStyle/>
           <a:p>
             <a:r>
-              <a:rPr lang="en-US" dirty="0" smtClean="0"/>
+              <a:rPr lang="en-US" dirty="0"/>
               <a:t>Abstract Syntax Tree</a:t>
             </a:r>
           </a:p>
           <a:p>
             <a:r>
-              <a:rPr lang="en-US" dirty="0" smtClean="0"/>
-              <a:t>Term Frequency – Inverse Document Frequency</a:t>
-            </a:r>
-          </a:p>
-          <a:p>
+              <a:rPr lang="en-US" dirty="0"/>
+              <a:t>Term Frequency – Inverse </a:t>
+            </a:r>
+            <a:r>
+              <a:rPr lang="en-US"/>
+              <a:t>Document Frequency</a:t>
+            </a:r>
             <a:endParaRPr lang="en-US" dirty="0"/>
           </a:p>
         </p:txBody>

</xml_diff>